<commit_message>
Version of slides actually used for the video.
</commit_message>
<xml_diff>
--- a/talks/2020-0712-lale.pptx
+++ b/talks/2020-0712-lale.pptx
@@ -628,7 +628,7 @@
           <a:bodyPr/>
           <a:lstStyle/>
           <a:p>
-            <a:fld id="{C31C586E-F59D-48D5-A1E6-554C975C46DC}" type="datetime1">
+            <a:fld id="{CCD6F8DF-31FC-44FC-8D44-74ADC274FC78}" type="datetime1">
               <a:rPr lang="en-US" smtClean="0"/>
               <a:t>7/3/2020</a:t>
             </a:fld>
@@ -826,7 +826,7 @@
           <a:bodyPr/>
           <a:lstStyle/>
           <a:p>
-            <a:fld id="{617AD03C-7838-4EBE-894D-1EFB94AE589C}" type="datetime1">
+            <a:fld id="{EBE14B64-59C0-414A-8763-28905AE2566E}" type="datetime1">
               <a:rPr lang="en-US" smtClean="0"/>
               <a:t>7/3/2020</a:t>
             </a:fld>
@@ -1034,7 +1034,7 @@
           <a:bodyPr/>
           <a:lstStyle/>
           <a:p>
-            <a:fld id="{64B608D8-DAD1-4463-A8B0-BF59D308DD0C}" type="datetime1">
+            <a:fld id="{8F67C3D3-E1B0-405B-AC09-C10C7023E4CF}" type="datetime1">
               <a:rPr lang="en-US" smtClean="0"/>
               <a:t>7/3/2020</a:t>
             </a:fld>
@@ -1232,7 +1232,7 @@
           <a:bodyPr/>
           <a:lstStyle/>
           <a:p>
-            <a:fld id="{5096C412-3D83-4E06-A355-D2AA8C7B9427}" type="datetime1">
+            <a:fld id="{679D093C-A8FE-4114-99F2-687C49AEF1A1}" type="datetime1">
               <a:rPr lang="en-US" smtClean="0"/>
               <a:t>7/3/2020</a:t>
             </a:fld>
@@ -1507,7 +1507,7 @@
           <a:bodyPr/>
           <a:lstStyle/>
           <a:p>
-            <a:fld id="{8090C63A-68F2-4015-BADD-E53173717B67}" type="datetime1">
+            <a:fld id="{8460CAAA-6A2A-4326-97F9-B326E2C92D21}" type="datetime1">
               <a:rPr lang="en-US" smtClean="0"/>
               <a:t>7/3/2020</a:t>
             </a:fld>
@@ -1772,7 +1772,7 @@
           <a:bodyPr/>
           <a:lstStyle/>
           <a:p>
-            <a:fld id="{13B3CF9E-7C37-4EAC-BEEB-CE8ABA7FA5C1}" type="datetime1">
+            <a:fld id="{FE566776-617F-4127-B515-3CD8B09DBAD4}" type="datetime1">
               <a:rPr lang="en-US" smtClean="0"/>
               <a:t>7/3/2020</a:t>
             </a:fld>
@@ -2184,7 +2184,7 @@
           <a:bodyPr/>
           <a:lstStyle/>
           <a:p>
-            <a:fld id="{8EE89563-614D-415D-A995-E842DDBD3EB1}" type="datetime1">
+            <a:fld id="{EC1C8E7D-4A87-4E90-BBCC-3DA2FA9F7DC2}" type="datetime1">
               <a:rPr lang="en-US" smtClean="0"/>
               <a:t>7/3/2020</a:t>
             </a:fld>
@@ -2325,7 +2325,7 @@
           <a:bodyPr/>
           <a:lstStyle/>
           <a:p>
-            <a:fld id="{04A4C1E0-7F29-4B0A-AA6F-C6A74B9B7EF4}" type="datetime1">
+            <a:fld id="{29E60A59-E04F-439E-9F23-5502BAE6F336}" type="datetime1">
               <a:rPr lang="en-US" smtClean="0"/>
               <a:t>7/3/2020</a:t>
             </a:fld>
@@ -2438,7 +2438,7 @@
           <a:bodyPr/>
           <a:lstStyle/>
           <a:p>
-            <a:fld id="{3032A3B8-486D-4FCA-A0E6-42D9E7DD698D}" type="datetime1">
+            <a:fld id="{E70A90F4-EA57-4FA9-96B0-D9538A37EB49}" type="datetime1">
               <a:rPr lang="en-US" smtClean="0"/>
               <a:t>7/3/2020</a:t>
             </a:fld>
@@ -2749,7 +2749,7 @@
           <a:bodyPr/>
           <a:lstStyle/>
           <a:p>
-            <a:fld id="{88AF2B60-0398-4D32-B2CA-C4D3F3E55250}" type="datetime1">
+            <a:fld id="{7B8898EF-43A8-49FF-B469-11667AD306BD}" type="datetime1">
               <a:rPr lang="en-US" smtClean="0"/>
               <a:t>7/3/2020</a:t>
             </a:fld>
@@ -3037,7 +3037,7 @@
           <a:bodyPr/>
           <a:lstStyle/>
           <a:p>
-            <a:fld id="{FA701054-9841-4356-8709-13ECB88F1BAD}" type="datetime1">
+            <a:fld id="{DCBA5E75-22E8-4843-9B01-CCE83582D6DD}" type="datetime1">
               <a:rPr lang="en-US" smtClean="0"/>
               <a:t>7/3/2020</a:t>
             </a:fld>
@@ -3278,7 +3278,7 @@
             </a:lvl1pPr>
           </a:lstStyle>
           <a:p>
-            <a:fld id="{BFE696E5-BD49-4815-B343-E16ABB44654B}" type="datetime1">
+            <a:fld id="{3B330C67-FFA1-420C-A7B5-D5A681519E1A}" type="datetime1">
               <a:rPr lang="en-US" smtClean="0"/>
               <a:t>7/3/2020</a:t>
             </a:fld>
@@ -3397,7 +3397,7 @@
     <p:sldLayoutId id="2147483658" r:id="rId10"/>
     <p:sldLayoutId id="2147483659" r:id="rId11"/>
   </p:sldLayoutIdLst>
-  <p:hf hdr="0" ftr="0" dt="0"/>
+  <p:hf sldNum="0" hdr="0" ftr="0" dt="0"/>
   <p:txStyles>
     <p:titleStyle>
       <a:lvl1pPr algn="l" defTabSz="914400" rtl="0" eaLnBrk="1" latinLnBrk="0" hangingPunct="1">
@@ -3714,7 +3714,12 @@
             <p:ph type="ctrTitle"/>
           </p:nvPr>
         </p:nvSpPr>
-        <p:spPr/>
+        <p:spPr>
+          <a:xfrm>
+            <a:off x="1524000" y="1110225"/>
+            <a:ext cx="9144000" cy="2387600"/>
+          </a:xfrm>
+        </p:spPr>
         <p:txBody>
           <a:bodyPr lIns="0" rIns="0" anchor="t" anchorCtr="0"/>
           <a:lstStyle/>
@@ -3744,7 +3749,12 @@
             <p:ph type="subTitle" idx="1"/>
           </p:nvPr>
         </p:nvSpPr>
-        <p:spPr/>
+        <p:spPr>
+          <a:xfrm>
+            <a:off x="1524000" y="3351186"/>
+            <a:ext cx="9144000" cy="1655762"/>
+          </a:xfrm>
+        </p:spPr>
         <p:txBody>
           <a:bodyPr>
             <a:noAutofit/>
@@ -3755,7 +3765,7 @@
               <a:rPr lang="en-US" sz="3200">
                 <a:latin typeface="Arial" panose="020B0604020202020204" pitchFamily="34" charset="0"/>
               </a:rPr>
-              <a:t>Talk at ICML 2020 Expo</a:t>
+              <a:t>Talk at ICML Expo, 12 July 2020</a:t>
             </a:r>
           </a:p>
           <a:p>
@@ -3771,38 +3781,13 @@
               <a:t>Guillaume Baudart, Martin Hirzel, Kiran Kate, Parikshit Ram, and Avraham Shinnar</a:t>
             </a:r>
           </a:p>
-        </p:txBody>
-      </p:sp>
-      <p:sp>
-        <p:nvSpPr>
-          <p:cNvPr id="4" name="Slide Number Placeholder 3">
-            <a:extLst>
-              <a:ext uri="{FF2B5EF4-FFF2-40B4-BE49-F238E27FC236}">
-                <a16:creationId xmlns:a16="http://schemas.microsoft.com/office/drawing/2014/main" id="{F1A034C3-E7B1-4264-9E78-22DDF562591F}"/>
-              </a:ext>
-            </a:extLst>
-          </p:cNvPr>
-          <p:cNvSpPr>
-            <a:spLocks noGrp="1"/>
-          </p:cNvSpPr>
-          <p:nvPr>
-            <p:ph type="sldNum" sz="quarter" idx="12"/>
-          </p:nvPr>
-        </p:nvSpPr>
-        <p:spPr/>
-        <p:txBody>
-          <a:bodyPr/>
-          <a:lstStyle/>
-          <a:p>
-            <a:fld id="{505B76AA-E2E0-484E-BF28-25A7E33B3E5E}" type="slidenum">
-              <a:rPr lang="en-US" smtClean="0">
+          <a:p>
+            <a:r>
+              <a:rPr lang="en-US" sz="3200" b="1">
                 <a:latin typeface="Arial" panose="020B0604020202020204" pitchFamily="34" charset="0"/>
               </a:rPr>
-              <a:t>1</a:t>
-            </a:fld>
-            <a:endParaRPr lang="en-US">
-              <a:latin typeface="Arial" panose="020B0604020202020204" pitchFamily="34" charset="0"/>
-            </a:endParaRPr>
+              <a:t>IBM Research AI</a:t>
+            </a:r>
           </a:p>
         </p:txBody>
       </p:sp>
@@ -3836,39 +3821,6 @@
           <a:chExt cx="0" cy="0"/>
         </a:xfrm>
       </p:grpSpPr>
-      <p:sp>
-        <p:nvSpPr>
-          <p:cNvPr id="4" name="Slide Number Placeholder 3">
-            <a:extLst>
-              <a:ext uri="{FF2B5EF4-FFF2-40B4-BE49-F238E27FC236}">
-                <a16:creationId xmlns:a16="http://schemas.microsoft.com/office/drawing/2014/main" id="{CBBD584C-47F3-4E75-AF6A-088B049BA5F4}"/>
-              </a:ext>
-            </a:extLst>
-          </p:cNvPr>
-          <p:cNvSpPr>
-            <a:spLocks noGrp="1"/>
-          </p:cNvSpPr>
-          <p:nvPr>
-            <p:ph type="sldNum" sz="quarter" idx="12"/>
-          </p:nvPr>
-        </p:nvSpPr>
-        <p:spPr/>
-        <p:txBody>
-          <a:bodyPr/>
-          <a:lstStyle/>
-          <a:p>
-            <a:fld id="{505B76AA-E2E0-484E-BF28-25A7E33B3E5E}" type="slidenum">
-              <a:rPr lang="en-US" smtClean="0">
-                <a:latin typeface="Arial" panose="020B0604020202020204" pitchFamily="34" charset="0"/>
-              </a:rPr>
-              <a:t>2</a:t>
-            </a:fld>
-            <a:endParaRPr lang="en-US">
-              <a:latin typeface="Arial" panose="020B0604020202020204" pitchFamily="34" charset="0"/>
-            </a:endParaRPr>
-          </a:p>
-        </p:txBody>
-      </p:sp>
       <p:pic>
         <p:nvPicPr>
           <p:cNvPr id="5" name="Picture 4">
@@ -4159,39 +4111,6 @@
           </a:prstGeom>
         </p:spPr>
       </p:pic>
-      <p:sp>
-        <p:nvSpPr>
-          <p:cNvPr id="4" name="Slide Number Placeholder 3">
-            <a:extLst>
-              <a:ext uri="{FF2B5EF4-FFF2-40B4-BE49-F238E27FC236}">
-                <a16:creationId xmlns:a16="http://schemas.microsoft.com/office/drawing/2014/main" id="{CBBD584C-47F3-4E75-AF6A-088B049BA5F4}"/>
-              </a:ext>
-            </a:extLst>
-          </p:cNvPr>
-          <p:cNvSpPr>
-            <a:spLocks noGrp="1"/>
-          </p:cNvSpPr>
-          <p:nvPr>
-            <p:ph type="sldNum" sz="quarter" idx="12"/>
-          </p:nvPr>
-        </p:nvSpPr>
-        <p:spPr/>
-        <p:txBody>
-          <a:bodyPr/>
-          <a:lstStyle/>
-          <a:p>
-            <a:fld id="{505B76AA-E2E0-484E-BF28-25A7E33B3E5E}" type="slidenum">
-              <a:rPr lang="en-US" smtClean="0">
-                <a:latin typeface="Arial" panose="020B0604020202020204" pitchFamily="34" charset="0"/>
-              </a:rPr>
-              <a:t>3</a:t>
-            </a:fld>
-            <a:endParaRPr lang="en-US">
-              <a:latin typeface="Arial" panose="020B0604020202020204" pitchFamily="34" charset="0"/>
-            </a:endParaRPr>
-          </a:p>
-        </p:txBody>
-      </p:sp>
       <p:pic>
         <p:nvPicPr>
           <p:cNvPr id="2" name="Picture 1">
@@ -4444,45 +4363,12 @@
           <a:chExt cx="0" cy="0"/>
         </a:xfrm>
       </p:grpSpPr>
-      <p:sp>
-        <p:nvSpPr>
-          <p:cNvPr id="4" name="Slide Number Placeholder 3">
-            <a:extLst>
-              <a:ext uri="{FF2B5EF4-FFF2-40B4-BE49-F238E27FC236}">
-                <a16:creationId xmlns:a16="http://schemas.microsoft.com/office/drawing/2014/main" id="{CBBD584C-47F3-4E75-AF6A-088B049BA5F4}"/>
-              </a:ext>
-            </a:extLst>
-          </p:cNvPr>
-          <p:cNvSpPr>
-            <a:spLocks noGrp="1"/>
-          </p:cNvSpPr>
-          <p:nvPr>
-            <p:ph type="sldNum" sz="quarter" idx="12"/>
-          </p:nvPr>
-        </p:nvSpPr>
-        <p:spPr/>
-        <p:txBody>
-          <a:bodyPr/>
-          <a:lstStyle/>
-          <a:p>
-            <a:fld id="{505B76AA-E2E0-484E-BF28-25A7E33B3E5E}" type="slidenum">
-              <a:rPr lang="en-US" smtClean="0">
-                <a:latin typeface="Arial" panose="020B0604020202020204" pitchFamily="34" charset="0"/>
-              </a:rPr>
-              <a:t>4</a:t>
-            </a:fld>
-            <a:endParaRPr lang="en-US">
-              <a:latin typeface="Arial" panose="020B0604020202020204" pitchFamily="34" charset="0"/>
-            </a:endParaRPr>
-          </a:p>
-        </p:txBody>
-      </p:sp>
       <p:pic>
         <p:nvPicPr>
-          <p:cNvPr id="3" name="Picture 2">
-            <a:extLst>
-              <a:ext uri="{FF2B5EF4-FFF2-40B4-BE49-F238E27FC236}">
-                <a16:creationId xmlns:a16="http://schemas.microsoft.com/office/drawing/2014/main" id="{F637A2FE-E84B-407A-A70E-9A18467D47FB}"/>
+          <p:cNvPr id="8" name="Picture 7">
+            <a:extLst>
+              <a:ext uri="{FF2B5EF4-FFF2-40B4-BE49-F238E27FC236}">
+                <a16:creationId xmlns:a16="http://schemas.microsoft.com/office/drawing/2014/main" id="{5CC62BD0-5547-46AE-9B1F-98DA18C220C4}"/>
               </a:ext>
             </a:extLst>
           </p:cNvPr>
@@ -4499,8 +4385,8 @@
         </p:blipFill>
         <p:spPr>
           <a:xfrm>
-            <a:off x="0" y="1769989"/>
-            <a:ext cx="12192000" cy="3353365"/>
+            <a:off x="-1" y="-1213918"/>
+            <a:ext cx="12192000" cy="2942118"/>
           </a:xfrm>
           <a:prstGeom prst="rect">
             <a:avLst/>
@@ -4509,10 +4395,10 @@
       </p:pic>
       <p:pic>
         <p:nvPicPr>
-          <p:cNvPr id="5" name="Picture 4">
-            <a:extLst>
-              <a:ext uri="{FF2B5EF4-FFF2-40B4-BE49-F238E27FC236}">
-                <a16:creationId xmlns:a16="http://schemas.microsoft.com/office/drawing/2014/main" id="{06E1B586-BDEE-4DB4-8202-6FBACAB417A7}"/>
+          <p:cNvPr id="3" name="Picture 2">
+            <a:extLst>
+              <a:ext uri="{FF2B5EF4-FFF2-40B4-BE49-F238E27FC236}">
+                <a16:creationId xmlns:a16="http://schemas.microsoft.com/office/drawing/2014/main" id="{F637A2FE-E84B-407A-A70E-9A18467D47FB}"/>
               </a:ext>
             </a:extLst>
           </p:cNvPr>
@@ -4529,7 +4415,37 @@
         </p:blipFill>
         <p:spPr>
           <a:xfrm>
-            <a:off x="0" y="0"/>
+            <a:off x="0" y="3501412"/>
+            <a:ext cx="12192000" cy="3353365"/>
+          </a:xfrm>
+          <a:prstGeom prst="rect">
+            <a:avLst/>
+          </a:prstGeom>
+        </p:spPr>
+      </p:pic>
+      <p:pic>
+        <p:nvPicPr>
+          <p:cNvPr id="5" name="Picture 4">
+            <a:extLst>
+              <a:ext uri="{FF2B5EF4-FFF2-40B4-BE49-F238E27FC236}">
+                <a16:creationId xmlns:a16="http://schemas.microsoft.com/office/drawing/2014/main" id="{06E1B586-BDEE-4DB4-8202-6FBACAB417A7}"/>
+              </a:ext>
+            </a:extLst>
+          </p:cNvPr>
+          <p:cNvPicPr>
+            <a:picLocks noChangeAspect="1"/>
+          </p:cNvPicPr>
+          <p:nvPr/>
+        </p:nvPicPr>
+        <p:blipFill>
+          <a:blip r:embed="rId4"/>
+          <a:stretch>
+            <a:fillRect/>
+          </a:stretch>
+        </p:blipFill>
+        <p:spPr>
+          <a:xfrm>
+            <a:off x="0" y="1731423"/>
             <a:ext cx="12192000" cy="1769989"/>
           </a:xfrm>
           <a:prstGeom prst="rect">
@@ -4634,7 +4550,47 @@
             </a:endParaRPr>
           </a:p>
           <a:p>
-            <a:endParaRPr lang="en-US" sz="1000" b="1">
+            <a:endParaRPr lang="en-US" sz="2000" b="1">
+              <a:solidFill>
+                <a:schemeClr val="accent1"/>
+              </a:solidFill>
+              <a:latin typeface="Arial" panose="020B0604020202020204" pitchFamily="34" charset="0"/>
+            </a:endParaRPr>
+          </a:p>
+          <a:p>
+            <a:endParaRPr lang="en-US" sz="2000" b="1">
+              <a:solidFill>
+                <a:schemeClr val="accent1"/>
+              </a:solidFill>
+              <a:latin typeface="Arial" panose="020B0604020202020204" pitchFamily="34" charset="0"/>
+            </a:endParaRPr>
+          </a:p>
+          <a:p>
+            <a:endParaRPr lang="en-US" sz="2000" b="1">
+              <a:solidFill>
+                <a:schemeClr val="accent1"/>
+              </a:solidFill>
+              <a:latin typeface="Arial" panose="020B0604020202020204" pitchFamily="34" charset="0"/>
+            </a:endParaRPr>
+          </a:p>
+          <a:p>
+            <a:endParaRPr lang="en-US" sz="2000" b="1">
+              <a:solidFill>
+                <a:schemeClr val="accent1"/>
+              </a:solidFill>
+              <a:latin typeface="Arial" panose="020B0604020202020204" pitchFamily="34" charset="0"/>
+            </a:endParaRPr>
+          </a:p>
+          <a:p>
+            <a:endParaRPr lang="en-US" sz="2000" b="1">
+              <a:solidFill>
+                <a:schemeClr val="accent1"/>
+              </a:solidFill>
+              <a:latin typeface="Arial" panose="020B0604020202020204" pitchFamily="34" charset="0"/>
+            </a:endParaRPr>
+          </a:p>
+          <a:p>
+            <a:endParaRPr lang="en-US" sz="2000" b="1">
               <a:solidFill>
                 <a:schemeClr val="accent1"/>
               </a:solidFill>
@@ -4702,7 +4658,7 @@
                 </a:solidFill>
                 <a:latin typeface="Arial" panose="020B0604020202020204" pitchFamily="34" charset="0"/>
               </a:rPr>
-              <a:t>for ML pipeline</a:t>
+              <a:t>for dataflow edges</a:t>
             </a:r>
           </a:p>
           <a:p>
@@ -4767,7 +4723,7 @@
                 </a:solidFill>
                 <a:latin typeface="Courier New" panose="02070309020205020404" pitchFamily="49" charset="0"/>
               </a:rPr>
-              <a:t>PCA</a:t>
+              <a:t>XGB</a:t>
             </a:r>
             <a:r>
               <a:rPr lang="en-US" strike="sngStrike">
@@ -4776,7 +4732,7 @@
                 </a:solidFill>
                 <a:latin typeface="Courier New" panose="02070309020205020404" pitchFamily="49" charset="0"/>
               </a:rPr>
-              <a:t>()</a:t>
+              <a:t>(…)</a:t>
             </a:r>
             <a:br>
               <a:rPr lang="en-US">
@@ -4828,45 +4784,12 @@
           <a:chExt cx="0" cy="0"/>
         </a:xfrm>
       </p:grpSpPr>
-      <p:sp>
-        <p:nvSpPr>
-          <p:cNvPr id="4" name="Slide Number Placeholder 3">
-            <a:extLst>
-              <a:ext uri="{FF2B5EF4-FFF2-40B4-BE49-F238E27FC236}">
-                <a16:creationId xmlns:a16="http://schemas.microsoft.com/office/drawing/2014/main" id="{CBBD584C-47F3-4E75-AF6A-088B049BA5F4}"/>
-              </a:ext>
-            </a:extLst>
-          </p:cNvPr>
-          <p:cNvSpPr>
-            <a:spLocks noGrp="1"/>
-          </p:cNvSpPr>
-          <p:nvPr>
-            <p:ph type="sldNum" sz="quarter" idx="12"/>
-          </p:nvPr>
-        </p:nvSpPr>
-        <p:spPr/>
-        <p:txBody>
-          <a:bodyPr/>
-          <a:lstStyle/>
-          <a:p>
-            <a:fld id="{505B76AA-E2E0-484E-BF28-25A7E33B3E5E}" type="slidenum">
-              <a:rPr lang="en-US" smtClean="0">
-                <a:latin typeface="Arial" panose="020B0604020202020204" pitchFamily="34" charset="0"/>
-              </a:rPr>
-              <a:t>5</a:t>
-            </a:fld>
-            <a:endParaRPr lang="en-US">
-              <a:latin typeface="Arial" panose="020B0604020202020204" pitchFamily="34" charset="0"/>
-            </a:endParaRPr>
-          </a:p>
-        </p:txBody>
-      </p:sp>
       <p:pic>
         <p:nvPicPr>
-          <p:cNvPr id="3" name="Picture 2">
-            <a:extLst>
-              <a:ext uri="{FF2B5EF4-FFF2-40B4-BE49-F238E27FC236}">
-                <a16:creationId xmlns:a16="http://schemas.microsoft.com/office/drawing/2014/main" id="{D8710CB0-AB06-466D-A857-887FD3272196}"/>
+          <p:cNvPr id="7" name="Picture 6">
+            <a:extLst>
+              <a:ext uri="{FF2B5EF4-FFF2-40B4-BE49-F238E27FC236}">
+                <a16:creationId xmlns:a16="http://schemas.microsoft.com/office/drawing/2014/main" id="{45A71F97-FB48-440C-AE0F-250983A8A084}"/>
               </a:ext>
             </a:extLst>
           </p:cNvPr>
@@ -4883,8 +4806,8 @@
         </p:blipFill>
         <p:spPr>
           <a:xfrm>
-            <a:off x="0" y="3353365"/>
-            <a:ext cx="12192000" cy="1702130"/>
+            <a:off x="-1" y="32516"/>
+            <a:ext cx="12192000" cy="1769989"/>
           </a:xfrm>
           <a:prstGeom prst="rect">
             <a:avLst/>
@@ -4893,10 +4816,10 @@
       </p:pic>
       <p:pic>
         <p:nvPicPr>
-          <p:cNvPr id="5" name="Picture 4">
-            <a:extLst>
-              <a:ext uri="{FF2B5EF4-FFF2-40B4-BE49-F238E27FC236}">
-                <a16:creationId xmlns:a16="http://schemas.microsoft.com/office/drawing/2014/main" id="{6ED5E3ED-153C-4E13-B973-09D36A8AC4EF}"/>
+          <p:cNvPr id="3" name="Picture 2">
+            <a:extLst>
+              <a:ext uri="{FF2B5EF4-FFF2-40B4-BE49-F238E27FC236}">
+                <a16:creationId xmlns:a16="http://schemas.microsoft.com/office/drawing/2014/main" id="{D8710CB0-AB06-466D-A857-887FD3272196}"/>
               </a:ext>
             </a:extLst>
           </p:cNvPr>
@@ -4913,7 +4836,37 @@
         </p:blipFill>
         <p:spPr>
           <a:xfrm>
-            <a:off x="0" y="0"/>
+            <a:off x="-1" y="5155870"/>
+            <a:ext cx="12192000" cy="1702130"/>
+          </a:xfrm>
+          <a:prstGeom prst="rect">
+            <a:avLst/>
+          </a:prstGeom>
+        </p:spPr>
+      </p:pic>
+      <p:pic>
+        <p:nvPicPr>
+          <p:cNvPr id="5" name="Picture 4">
+            <a:extLst>
+              <a:ext uri="{FF2B5EF4-FFF2-40B4-BE49-F238E27FC236}">
+                <a16:creationId xmlns:a16="http://schemas.microsoft.com/office/drawing/2014/main" id="{6ED5E3ED-153C-4E13-B973-09D36A8AC4EF}"/>
+              </a:ext>
+            </a:extLst>
+          </p:cNvPr>
+          <p:cNvPicPr>
+            <a:picLocks noChangeAspect="1"/>
+          </p:cNvPicPr>
+          <p:nvPr/>
+        </p:nvPicPr>
+        <p:blipFill>
+          <a:blip r:embed="rId4"/>
+          <a:stretch>
+            <a:fillRect/>
+          </a:stretch>
+        </p:blipFill>
+        <p:spPr>
+          <a:xfrm>
+            <a:off x="-1" y="1802505"/>
             <a:ext cx="12192000" cy="3353365"/>
           </a:xfrm>
           <a:prstGeom prst="rect">
@@ -5042,6 +4995,54 @@
             </a:endParaRPr>
           </a:p>
           <a:p>
+            <a:endParaRPr lang="en-US" sz="2000" b="1">
+              <a:solidFill>
+                <a:schemeClr val="accent1"/>
+              </a:solidFill>
+              <a:latin typeface="Arial" panose="020B0604020202020204" pitchFamily="34" charset="0"/>
+            </a:endParaRPr>
+          </a:p>
+          <a:p>
+            <a:endParaRPr lang="en-US" sz="2000" b="1">
+              <a:solidFill>
+                <a:schemeClr val="accent1"/>
+              </a:solidFill>
+              <a:latin typeface="Arial" panose="020B0604020202020204" pitchFamily="34" charset="0"/>
+            </a:endParaRPr>
+          </a:p>
+          <a:p>
+            <a:endParaRPr lang="en-US" sz="2000" b="1">
+              <a:solidFill>
+                <a:schemeClr val="accent1"/>
+              </a:solidFill>
+              <a:latin typeface="Arial" panose="020B0604020202020204" pitchFamily="34" charset="0"/>
+            </a:endParaRPr>
+          </a:p>
+          <a:p>
+            <a:endParaRPr lang="en-US" sz="2000" b="1">
+              <a:solidFill>
+                <a:schemeClr val="accent1"/>
+              </a:solidFill>
+              <a:latin typeface="Arial" panose="020B0604020202020204" pitchFamily="34" charset="0"/>
+            </a:endParaRPr>
+          </a:p>
+          <a:p>
+            <a:endParaRPr lang="en-US" sz="2000" b="1">
+              <a:solidFill>
+                <a:schemeClr val="accent1"/>
+              </a:solidFill>
+              <a:latin typeface="Arial" panose="020B0604020202020204" pitchFamily="34" charset="0"/>
+            </a:endParaRPr>
+          </a:p>
+          <a:p>
+            <a:endParaRPr lang="en-US" sz="2000" b="1">
+              <a:solidFill>
+                <a:schemeClr val="accent1"/>
+              </a:solidFill>
+              <a:latin typeface="Arial" panose="020B0604020202020204" pitchFamily="34" charset="0"/>
+            </a:endParaRPr>
+          </a:p>
+          <a:p>
             <a:endParaRPr lang="en-US" sz="1000" b="1">
               <a:solidFill>
                 <a:schemeClr val="accent1"/>
@@ -5181,39 +5182,6 @@
           </a:prstGeom>
         </p:spPr>
       </p:pic>
-      <p:sp>
-        <p:nvSpPr>
-          <p:cNvPr id="4" name="Slide Number Placeholder 3">
-            <a:extLst>
-              <a:ext uri="{FF2B5EF4-FFF2-40B4-BE49-F238E27FC236}">
-                <a16:creationId xmlns:a16="http://schemas.microsoft.com/office/drawing/2014/main" id="{CBBD584C-47F3-4E75-AF6A-088B049BA5F4}"/>
-              </a:ext>
-            </a:extLst>
-          </p:cNvPr>
-          <p:cNvSpPr>
-            <a:spLocks noGrp="1"/>
-          </p:cNvSpPr>
-          <p:nvPr>
-            <p:ph type="sldNum" sz="quarter" idx="12"/>
-          </p:nvPr>
-        </p:nvSpPr>
-        <p:spPr/>
-        <p:txBody>
-          <a:bodyPr/>
-          <a:lstStyle/>
-          <a:p>
-            <a:fld id="{505B76AA-E2E0-484E-BF28-25A7E33B3E5E}" type="slidenum">
-              <a:rPr lang="en-US" smtClean="0">
-                <a:latin typeface="Arial" panose="020B0604020202020204" pitchFamily="34" charset="0"/>
-              </a:rPr>
-              <a:t>6</a:t>
-            </a:fld>
-            <a:endParaRPr lang="en-US">
-              <a:latin typeface="Arial" panose="020B0604020202020204" pitchFamily="34" charset="0"/>
-            </a:endParaRPr>
-          </a:p>
-        </p:txBody>
-      </p:sp>
       <p:pic>
         <p:nvPicPr>
           <p:cNvPr id="7" name="Picture 6">
@@ -5549,8 +5517,8 @@
         </p:nvSpPr>
         <p:spPr>
           <a:xfrm rot="13192428">
-            <a:off x="4234897" y="6276771"/>
-            <a:ext cx="277586" cy="195943"/>
+            <a:off x="4223866" y="6295046"/>
+            <a:ext cx="187956" cy="112137"/>
           </a:xfrm>
           <a:prstGeom prst="notchedRightArrow">
             <a:avLst/>
@@ -5619,39 +5587,6 @@
           <a:chExt cx="0" cy="0"/>
         </a:xfrm>
       </p:grpSpPr>
-      <p:sp>
-        <p:nvSpPr>
-          <p:cNvPr id="4" name="Slide Number Placeholder 3">
-            <a:extLst>
-              <a:ext uri="{FF2B5EF4-FFF2-40B4-BE49-F238E27FC236}">
-                <a16:creationId xmlns:a16="http://schemas.microsoft.com/office/drawing/2014/main" id="{CBBD584C-47F3-4E75-AF6A-088B049BA5F4}"/>
-              </a:ext>
-            </a:extLst>
-          </p:cNvPr>
-          <p:cNvSpPr>
-            <a:spLocks noGrp="1"/>
-          </p:cNvSpPr>
-          <p:nvPr>
-            <p:ph type="sldNum" sz="quarter" idx="12"/>
-          </p:nvPr>
-        </p:nvSpPr>
-        <p:spPr/>
-        <p:txBody>
-          <a:bodyPr/>
-          <a:lstStyle/>
-          <a:p>
-            <a:fld id="{505B76AA-E2E0-484E-BF28-25A7E33B3E5E}" type="slidenum">
-              <a:rPr lang="en-US" smtClean="0">
-                <a:latin typeface="Arial" panose="020B0604020202020204" pitchFamily="34" charset="0"/>
-              </a:rPr>
-              <a:t>7</a:t>
-            </a:fld>
-            <a:endParaRPr lang="en-US">
-              <a:latin typeface="Arial" panose="020B0604020202020204" pitchFamily="34" charset="0"/>
-            </a:endParaRPr>
-          </a:p>
-        </p:txBody>
-      </p:sp>
       <p:pic>
         <p:nvPicPr>
           <p:cNvPr id="2" name="Picture 1">
@@ -5994,39 +5929,6 @@
               <a:solidFill>
                 <a:schemeClr val="accent1"/>
               </a:solidFill>
-              <a:latin typeface="Arial" panose="020B0604020202020204" pitchFamily="34" charset="0"/>
-            </a:endParaRPr>
-          </a:p>
-        </p:txBody>
-      </p:sp>
-      <p:sp>
-        <p:nvSpPr>
-          <p:cNvPr id="4" name="Slide Number Placeholder 3">
-            <a:extLst>
-              <a:ext uri="{FF2B5EF4-FFF2-40B4-BE49-F238E27FC236}">
-                <a16:creationId xmlns:a16="http://schemas.microsoft.com/office/drawing/2014/main" id="{CBBD584C-47F3-4E75-AF6A-088B049BA5F4}"/>
-              </a:ext>
-            </a:extLst>
-          </p:cNvPr>
-          <p:cNvSpPr>
-            <a:spLocks noGrp="1"/>
-          </p:cNvSpPr>
-          <p:nvPr>
-            <p:ph type="sldNum" sz="quarter" idx="12"/>
-          </p:nvPr>
-        </p:nvSpPr>
-        <p:spPr/>
-        <p:txBody>
-          <a:bodyPr/>
-          <a:lstStyle/>
-          <a:p>
-            <a:fld id="{505B76AA-E2E0-484E-BF28-25A7E33B3E5E}" type="slidenum">
-              <a:rPr lang="en-US" smtClean="0">
-                <a:latin typeface="Arial" panose="020B0604020202020204" pitchFamily="34" charset="0"/>
-              </a:rPr>
-              <a:t>8</a:t>
-            </a:fld>
-            <a:endParaRPr lang="en-US">
               <a:latin typeface="Arial" panose="020B0604020202020204" pitchFamily="34" charset="0"/>
             </a:endParaRPr>
           </a:p>
@@ -6426,39 +6328,6 @@
           <a:chExt cx="0" cy="0"/>
         </a:xfrm>
       </p:grpSpPr>
-      <p:sp>
-        <p:nvSpPr>
-          <p:cNvPr id="4" name="Slide Number Placeholder 3">
-            <a:extLst>
-              <a:ext uri="{FF2B5EF4-FFF2-40B4-BE49-F238E27FC236}">
-                <a16:creationId xmlns:a16="http://schemas.microsoft.com/office/drawing/2014/main" id="{CBBD584C-47F3-4E75-AF6A-088B049BA5F4}"/>
-              </a:ext>
-            </a:extLst>
-          </p:cNvPr>
-          <p:cNvSpPr>
-            <a:spLocks noGrp="1"/>
-          </p:cNvSpPr>
-          <p:nvPr>
-            <p:ph type="sldNum" sz="quarter" idx="12"/>
-          </p:nvPr>
-        </p:nvSpPr>
-        <p:spPr/>
-        <p:txBody>
-          <a:bodyPr/>
-          <a:lstStyle/>
-          <a:p>
-            <a:fld id="{505B76AA-E2E0-484E-BF28-25A7E33B3E5E}" type="slidenum">
-              <a:rPr lang="en-US" smtClean="0">
-                <a:latin typeface="Arial" panose="020B0604020202020204" pitchFamily="34" charset="0"/>
-              </a:rPr>
-              <a:t>9</a:t>
-            </a:fld>
-            <a:endParaRPr lang="en-US">
-              <a:latin typeface="Arial" panose="020B0604020202020204" pitchFamily="34" charset="0"/>
-            </a:endParaRPr>
-          </a:p>
-        </p:txBody>
-      </p:sp>
       <p:pic>
         <p:nvPicPr>
           <p:cNvPr id="3" name="Graphic 2">

</xml_diff>